<commit_message>
Add Lecture_4 pptx modified
Add Lecture_4 pptx modified
</commit_message>
<xml_diff>
--- a/iot_4강_crawling.pptx
+++ b/iot_4강_crawling.pptx
@@ -5,7 +5,7 @@
     <p:sldMasterId id="2147483648" r:id="rId4"/>
   </p:sldMasterIdLst>
   <p:notesMasterIdLst>
-    <p:notesMasterId r:id="rId28"/>
+    <p:notesMasterId r:id="rId29"/>
   </p:notesMasterIdLst>
   <p:sldIdLst>
     <p:sldId id="301" r:id="rId5"/>
@@ -19,18 +19,19 @@
     <p:sldId id="308" r:id="rId13"/>
     <p:sldId id="309" r:id="rId14"/>
     <p:sldId id="321" r:id="rId15"/>
-    <p:sldId id="318" r:id="rId16"/>
-    <p:sldId id="319" r:id="rId17"/>
-    <p:sldId id="320" r:id="rId18"/>
-    <p:sldId id="323" r:id="rId19"/>
-    <p:sldId id="316" r:id="rId20"/>
-    <p:sldId id="312" r:id="rId21"/>
-    <p:sldId id="310" r:id="rId22"/>
-    <p:sldId id="317" r:id="rId23"/>
-    <p:sldId id="313" r:id="rId24"/>
-    <p:sldId id="311" r:id="rId25"/>
-    <p:sldId id="315" r:id="rId26"/>
-    <p:sldId id="322" r:id="rId27"/>
+    <p:sldId id="324" r:id="rId16"/>
+    <p:sldId id="318" r:id="rId17"/>
+    <p:sldId id="319" r:id="rId18"/>
+    <p:sldId id="320" r:id="rId19"/>
+    <p:sldId id="323" r:id="rId20"/>
+    <p:sldId id="316" r:id="rId21"/>
+    <p:sldId id="312" r:id="rId22"/>
+    <p:sldId id="310" r:id="rId23"/>
+    <p:sldId id="317" r:id="rId24"/>
+    <p:sldId id="313" r:id="rId25"/>
+    <p:sldId id="311" r:id="rId26"/>
+    <p:sldId id="315" r:id="rId27"/>
+    <p:sldId id="322" r:id="rId28"/>
   </p:sldIdLst>
   <p:sldSz cx="12192000" cy="6858000"/>
   <p:notesSz cx="6858000" cy="9144000"/>
@@ -227,7 +228,7 @@
           <a:p>
             <a:fld id="{860E4C0E-3822-4470-875C-25F6E634D1E2}" type="datetimeFigureOut">
               <a:rPr lang="ko-KR" altLang="en-US" smtClean="0"/>
-              <a:t>2021-11-26</a:t>
+              <a:t>2021-11-27</a:t>
             </a:fld>
             <a:endParaRPr lang="ko-KR" altLang="en-US"/>
           </a:p>
@@ -645,7 +646,7 @@
           <a:p>
             <a:fld id="{3D067A03-45D1-4EAE-8DA0-F79B7BEE625A}" type="datetimeFigureOut">
               <a:rPr lang="ko-KR" altLang="en-US" smtClean="0"/>
-              <a:t>2021-11-26</a:t>
+              <a:t>2021-11-27</a:t>
             </a:fld>
             <a:endParaRPr lang="ko-KR" altLang="en-US"/>
           </a:p>
@@ -1369,7 +1370,7 @@
           <a:p>
             <a:fld id="{3D067A03-45D1-4EAE-8DA0-F79B7BEE625A}" type="datetimeFigureOut">
               <a:rPr lang="ko-KR" altLang="en-US" smtClean="0"/>
-              <a:t>2021-11-26</a:t>
+              <a:t>2021-11-27</a:t>
             </a:fld>
             <a:endParaRPr lang="ko-KR" altLang="en-US"/>
           </a:p>
@@ -1960,7 +1961,7 @@
           <a:p>
             <a:fld id="{3D067A03-45D1-4EAE-8DA0-F79B7BEE625A}" type="datetimeFigureOut">
               <a:rPr lang="ko-KR" altLang="en-US" smtClean="0"/>
-              <a:t>2021-11-26</a:t>
+              <a:t>2021-11-27</a:t>
             </a:fld>
             <a:endParaRPr lang="ko-KR" altLang="en-US"/>
           </a:p>
@@ -2476,7 +2477,7 @@
           <a:p>
             <a:fld id="{3D067A03-45D1-4EAE-8DA0-F79B7BEE625A}" type="datetimeFigureOut">
               <a:rPr lang="ko-KR" altLang="en-US" smtClean="0"/>
-              <a:t>2021-11-26</a:t>
+              <a:t>2021-11-27</a:t>
             </a:fld>
             <a:endParaRPr lang="ko-KR" altLang="en-US"/>
           </a:p>
@@ -3057,7 +3058,7 @@
           <a:p>
             <a:fld id="{3D067A03-45D1-4EAE-8DA0-F79B7BEE625A}" type="datetimeFigureOut">
               <a:rPr lang="ko-KR" altLang="en-US" smtClean="0"/>
-              <a:t>2021-11-26</a:t>
+              <a:t>2021-11-27</a:t>
             </a:fld>
             <a:endParaRPr lang="ko-KR" altLang="en-US"/>
           </a:p>
@@ -3711,7 +3712,7 @@
           <a:p>
             <a:fld id="{3D067A03-45D1-4EAE-8DA0-F79B7BEE625A}" type="datetimeFigureOut">
               <a:rPr lang="ko-KR" altLang="en-US" smtClean="0"/>
-              <a:t>2021-11-26</a:t>
+              <a:t>2021-11-27</a:t>
             </a:fld>
             <a:endParaRPr lang="ko-KR" altLang="en-US"/>
           </a:p>
@@ -4359,7 +4360,7 @@
           <a:p>
             <a:fld id="{3D067A03-45D1-4EAE-8DA0-F79B7BEE625A}" type="datetimeFigureOut">
               <a:rPr lang="ko-KR" altLang="en-US" smtClean="0"/>
-              <a:t>2021-11-26</a:t>
+              <a:t>2021-11-27</a:t>
             </a:fld>
             <a:endParaRPr lang="ko-KR" altLang="en-US"/>
           </a:p>
@@ -5154,7 +5155,7 @@
           <a:p>
             <a:fld id="{3D067A03-45D1-4EAE-8DA0-F79B7BEE625A}" type="datetimeFigureOut">
               <a:rPr lang="ko-KR" altLang="en-US" smtClean="0"/>
-              <a:t>2021-11-26</a:t>
+              <a:t>2021-11-27</a:t>
             </a:fld>
             <a:endParaRPr lang="ko-KR" altLang="en-US"/>
           </a:p>
@@ -5678,7 +5679,7 @@
           <a:p>
             <a:fld id="{3D067A03-45D1-4EAE-8DA0-F79B7BEE625A}" type="datetimeFigureOut">
               <a:rPr lang="ko-KR" altLang="en-US" smtClean="0"/>
-              <a:t>2021-11-26</a:t>
+              <a:t>2021-11-27</a:t>
             </a:fld>
             <a:endParaRPr lang="ko-KR" altLang="en-US"/>
           </a:p>
@@ -6166,7 +6167,7 @@
           <a:p>
             <a:fld id="{3D067A03-45D1-4EAE-8DA0-F79B7BEE625A}" type="datetimeFigureOut">
               <a:rPr lang="ko-KR" altLang="en-US" smtClean="0"/>
-              <a:t>2021-11-26</a:t>
+              <a:t>2021-11-27</a:t>
             </a:fld>
             <a:endParaRPr lang="ko-KR" altLang="en-US"/>
           </a:p>
@@ -6876,7 +6877,7 @@
           <a:p>
             <a:fld id="{3D067A03-45D1-4EAE-8DA0-F79B7BEE625A}" type="datetimeFigureOut">
               <a:rPr lang="ko-KR" altLang="en-US" smtClean="0"/>
-              <a:t>2021-11-26</a:t>
+              <a:t>2021-11-27</a:t>
             </a:fld>
             <a:endParaRPr lang="ko-KR" altLang="en-US"/>
           </a:p>
@@ -7543,7 +7544,7 @@
           <a:p>
             <a:fld id="{3D067A03-45D1-4EAE-8DA0-F79B7BEE625A}" type="datetimeFigureOut">
               <a:rPr lang="ko-KR" altLang="en-US" smtClean="0"/>
-              <a:t>2021-11-26</a:t>
+              <a:t>2021-11-27</a:t>
             </a:fld>
             <a:endParaRPr lang="ko-KR" altLang="en-US"/>
           </a:p>
@@ -8159,7 +8160,7 @@
           <a:p>
             <a:fld id="{3D067A03-45D1-4EAE-8DA0-F79B7BEE625A}" type="datetimeFigureOut">
               <a:rPr lang="ko-KR" altLang="en-US" smtClean="0"/>
-              <a:t>2021-11-26</a:t>
+              <a:t>2021-11-27</a:t>
             </a:fld>
             <a:endParaRPr lang="ko-KR" altLang="en-US"/>
           </a:p>
@@ -8974,7 +8975,7 @@
           <p:cNvPr id="2" name="제목 1">
             <a:extLst>
               <a:ext uri="{FF2B5EF4-FFF2-40B4-BE49-F238E27FC236}">
-                <a16:creationId xmlns:a16="http://schemas.microsoft.com/office/drawing/2014/main" id="{8FEFD956-B601-4E6B-8C3F-C35AE3297B3E}"/>
+                <a16:creationId xmlns:a16="http://schemas.microsoft.com/office/drawing/2014/main" id="{75C0A144-45DC-4C98-8D57-AF23EA62720C}"/>
               </a:ext>
             </a:extLst>
           </p:cNvPr>
@@ -8991,52 +8992,26 @@
           <a:lstStyle/>
           <a:p>
             <a:r>
-              <a:rPr lang="en-US" altLang="ko-KR" dirty="0" err="1"/>
-              <a:t>requests.get</a:t>
+              <a:rPr lang="ko-KR" altLang="en-US" dirty="0"/>
+              <a:t>리눅스 </a:t>
             </a:r>
             <a:r>
               <a:rPr lang="en-US" altLang="ko-KR" dirty="0"/>
-              <a:t>()</a:t>
-            </a:r>
-            <a:endParaRPr lang="ko-KR" altLang="en-US" dirty="0"/>
-          </a:p>
-        </p:txBody>
-      </p:sp>
-      <p:pic>
-        <p:nvPicPr>
-          <p:cNvPr id="6" name="내용 개체 틀 5">
-            <a:extLst>
-              <a:ext uri="{FF2B5EF4-FFF2-40B4-BE49-F238E27FC236}">
-                <a16:creationId xmlns:a16="http://schemas.microsoft.com/office/drawing/2014/main" id="{9D5D544F-BC4C-4BCF-8BC4-050BFBE2F0AB}"/>
-              </a:ext>
-            </a:extLst>
-          </p:cNvPr>
-          <p:cNvPicPr>
-            <a:picLocks noGrp="1" noChangeAspect="1"/>
-          </p:cNvPicPr>
-          <p:nvPr>
-            <p:ph sz="half" idx="1"/>
-          </p:nvPr>
-        </p:nvPicPr>
-        <p:blipFill>
-          <a:blip r:embed="rId2"/>
-          <a:stretch>
-            <a:fillRect/>
-          </a:stretch>
-        </p:blipFill>
-        <p:spPr>
-          <a:xfrm>
-            <a:off x="753140" y="2945381"/>
-            <a:ext cx="5181600" cy="1052461"/>
-          </a:xfrm>
-        </p:spPr>
-      </p:pic>
-      <p:sp>
-        <p:nvSpPr>
-          <p:cNvPr id="4" name="내용 개체 틀 3">
-            <a:extLst>
-              <a:ext uri="{FF2B5EF4-FFF2-40B4-BE49-F238E27FC236}">
-                <a16:creationId xmlns:a16="http://schemas.microsoft.com/office/drawing/2014/main" id="{9ADD6CEA-F498-40A1-8653-0FE387641709}"/>
+              <a:t>pip </a:t>
+            </a:r>
+            <a:r>
+              <a:rPr lang="ko-KR" altLang="en-US" dirty="0"/>
+              <a:t>설치</a:t>
+            </a:r>
+          </a:p>
+        </p:txBody>
+      </p:sp>
+      <p:sp>
+        <p:nvSpPr>
+          <p:cNvPr id="3" name="내용 개체 틀 2">
+            <a:extLst>
+              <a:ext uri="{FF2B5EF4-FFF2-40B4-BE49-F238E27FC236}">
+                <a16:creationId xmlns:a16="http://schemas.microsoft.com/office/drawing/2014/main" id="{A72FEB16-1B4B-44B4-972E-AEFC9ECF69B3}"/>
               </a:ext>
             </a:extLst>
           </p:cNvPr>
@@ -9044,7 +9019,7 @@
             <a:spLocks noGrp="1"/>
           </p:cNvSpPr>
           <p:nvPr>
-            <p:ph sz="half" idx="2"/>
+            <p:ph idx="1"/>
           </p:nvPr>
         </p:nvSpPr>
         <p:spPr/>
@@ -9056,60 +9031,143 @@
               <a:buNone/>
             </a:pPr>
             <a:r>
-              <a:rPr lang="ko-KR" altLang="en-US" dirty="0"/>
-              <a:t>해당 주소로 </a:t>
-            </a:r>
-            <a:r>
-              <a:rPr lang="en-US" altLang="ko-KR" dirty="0"/>
-              <a:t>GET </a:t>
-            </a:r>
-            <a:r>
-              <a:rPr lang="ko-KR" altLang="en-US" dirty="0"/>
-              <a:t>요청을 보낸다</a:t>
-            </a:r>
-            <a:r>
-              <a:rPr lang="en-US" altLang="ko-KR" dirty="0"/>
-              <a:t>.</a:t>
+              <a:rPr lang="en-US" altLang="ko-KR" b="0" i="0" dirty="0" err="1">
+                <a:solidFill>
+                  <a:srgbClr val="111111"/>
+                </a:solidFill>
+                <a:effectLst/>
+                <a:latin typeface="Apple SD Gothic Neo"/>
+              </a:rPr>
+              <a:t>sudo</a:t>
+            </a:r>
+            <a:r>
+              <a:rPr lang="en-US" altLang="ko-KR" b="0" i="0" dirty="0">
+                <a:solidFill>
+                  <a:srgbClr val="111111"/>
+                </a:solidFill>
+                <a:effectLst/>
+                <a:latin typeface="Apple SD Gothic Neo"/>
+              </a:rPr>
+              <a:t> apt-get update</a:t>
             </a:r>
           </a:p>
           <a:p>
             <a:pPr marL="0" indent="0">
               <a:buNone/>
             </a:pPr>
-            <a:r>
-              <a:rPr lang="ko-KR" altLang="en-US" dirty="0"/>
-              <a:t>응답을 </a:t>
-            </a:r>
-            <a:r>
-              <a:rPr lang="ko-KR" altLang="en-US" dirty="0" err="1"/>
-              <a:t>리턴한다</a:t>
-            </a:r>
-            <a:r>
-              <a:rPr lang="en-US" altLang="ko-KR" dirty="0"/>
-              <a:t>.</a:t>
-            </a:r>
+            <a:endParaRPr lang="en-US" altLang="ko-KR" b="0" i="0" dirty="0">
+              <a:solidFill>
+                <a:srgbClr val="111111"/>
+              </a:solidFill>
+              <a:effectLst/>
+              <a:latin typeface="Apple SD Gothic Neo"/>
+            </a:endParaRPr>
           </a:p>
           <a:p>
             <a:pPr marL="0" indent="0">
               <a:buNone/>
             </a:pPr>
-            <a:endParaRPr lang="en-US" altLang="ko-KR" dirty="0"/>
+            <a:r>
+              <a:rPr lang="en-US" altLang="ko-KR" b="0" i="0" dirty="0" err="1">
+                <a:solidFill>
+                  <a:srgbClr val="111111"/>
+                </a:solidFill>
+                <a:effectLst/>
+                <a:latin typeface="Apple SD Gothic Neo"/>
+              </a:rPr>
+              <a:t>sudo</a:t>
+            </a:r>
+            <a:r>
+              <a:rPr lang="en-US" altLang="ko-KR" b="0" i="0" dirty="0">
+                <a:solidFill>
+                  <a:srgbClr val="111111"/>
+                </a:solidFill>
+                <a:effectLst/>
+                <a:latin typeface="Apple SD Gothic Neo"/>
+              </a:rPr>
+              <a:t> apt-get install python-pip</a:t>
+            </a:r>
+            <a:endParaRPr lang="en-US" altLang="ko-KR" dirty="0">
+              <a:solidFill>
+                <a:srgbClr val="111111"/>
+              </a:solidFill>
+              <a:latin typeface="Apple SD Gothic Neo"/>
+            </a:endParaRPr>
           </a:p>
           <a:p>
             <a:pPr marL="0" indent="0">
               <a:buNone/>
             </a:pPr>
             <a:r>
+              <a:rPr lang="en-US" altLang="ko-KR" b="0" i="0" dirty="0">
+                <a:solidFill>
+                  <a:srgbClr val="111111"/>
+                </a:solidFill>
+                <a:effectLst/>
+                <a:latin typeface="Apple SD Gothic Neo"/>
+              </a:rPr>
+              <a:t>(</a:t>
+            </a:r>
+            <a:r>
+              <a:rPr lang="en-US" altLang="ko-KR" b="0" i="0" dirty="0" err="1">
+                <a:solidFill>
+                  <a:srgbClr val="111111"/>
+                </a:solidFill>
+                <a:effectLst/>
+                <a:latin typeface="Apple SD Gothic Neo"/>
+              </a:rPr>
+              <a:t>sudo</a:t>
+            </a:r>
+            <a:r>
+              <a:rPr lang="en-US" altLang="ko-KR" b="0" i="0" dirty="0">
+                <a:solidFill>
+                  <a:srgbClr val="111111"/>
+                </a:solidFill>
+                <a:effectLst/>
+                <a:latin typeface="Apple SD Gothic Neo"/>
+              </a:rPr>
+              <a:t> apt-get install python3-pip)</a:t>
+            </a:r>
+          </a:p>
+          <a:p>
+            <a:pPr marL="0" indent="0">
+              <a:buNone/>
+            </a:pPr>
+            <a:endParaRPr lang="en-US" altLang="ko-KR" dirty="0">
+              <a:solidFill>
+                <a:srgbClr val="111111"/>
+              </a:solidFill>
+              <a:latin typeface="Apple SD Gothic Neo"/>
+            </a:endParaRPr>
+          </a:p>
+          <a:p>
+            <a:pPr marL="0" indent="0">
+              <a:buNone/>
+            </a:pPr>
+            <a:r>
+              <a:rPr lang="en-US" altLang="ko-KR" dirty="0"/>
+              <a:t>pip3</a:t>
+            </a:r>
+            <a:r>
               <a:rPr lang="ko-KR" altLang="en-US" dirty="0"/>
-              <a:t>응답의 내용 </a:t>
+              <a:t> </a:t>
             </a:r>
             <a:r>
               <a:rPr lang="en-US" altLang="ko-KR" dirty="0"/>
-              <a:t>= HTML</a:t>
+              <a:t>–version</a:t>
+            </a:r>
+          </a:p>
+          <a:p>
+            <a:pPr marL="0" indent="0">
+              <a:buNone/>
+            </a:pPr>
+            <a:r>
+              <a:rPr lang="en-US" altLang="ko-KR" dirty="0"/>
+              <a:t>pip3 install </a:t>
             </a:r>
             <a:r>
               <a:rPr lang="ko-KR" altLang="en-US" dirty="0"/>
-              <a:t>코드</a:t>
+              <a:t>패키지이름</a:t>
             </a:r>
           </a:p>
         </p:txBody>
@@ -9117,7 +9175,7 @@
     </p:spTree>
     <p:extLst>
       <p:ext uri="{BB962C8B-B14F-4D97-AF65-F5344CB8AC3E}">
-        <p14:creationId xmlns:p14="http://schemas.microsoft.com/office/powerpoint/2010/main" val="500306982"/>
+        <p14:creationId xmlns:p14="http://schemas.microsoft.com/office/powerpoint/2010/main" val="2721789360"/>
       </p:ext>
     </p:extLst>
   </p:cSld>
@@ -9149,7 +9207,7 @@
           <p:cNvPr id="2" name="제목 1">
             <a:extLst>
               <a:ext uri="{FF2B5EF4-FFF2-40B4-BE49-F238E27FC236}">
-                <a16:creationId xmlns:a16="http://schemas.microsoft.com/office/drawing/2014/main" id="{0B2B955C-B17A-4470-9826-C0DF6AF6B3FC}"/>
+                <a16:creationId xmlns:a16="http://schemas.microsoft.com/office/drawing/2014/main" id="{8FEFD956-B601-4E6B-8C3F-C35AE3297B3E}"/>
               </a:ext>
             </a:extLst>
           </p:cNvPr>
@@ -9167,7 +9225,7 @@
           <a:p>
             <a:r>
               <a:rPr lang="en-US" altLang="ko-KR" dirty="0" err="1"/>
-              <a:t>BeautifulSoup</a:t>
+              <a:t>requests.get</a:t>
             </a:r>
             <a:r>
               <a:rPr lang="en-US" altLang="ko-KR" dirty="0"/>
@@ -9182,7 +9240,7 @@
           <p:cNvPr id="6" name="내용 개체 틀 5">
             <a:extLst>
               <a:ext uri="{FF2B5EF4-FFF2-40B4-BE49-F238E27FC236}">
-                <a16:creationId xmlns:a16="http://schemas.microsoft.com/office/drawing/2014/main" id="{EDD82888-185E-414E-AEB7-43A1CAA474B4}"/>
+                <a16:creationId xmlns:a16="http://schemas.microsoft.com/office/drawing/2014/main" id="{9D5D544F-BC4C-4BCF-8BC4-050BFBE2F0AB}"/>
               </a:ext>
             </a:extLst>
           </p:cNvPr>
@@ -9201,8 +9259,8 @@
         </p:blipFill>
         <p:spPr>
           <a:xfrm>
-            <a:off x="651163" y="2376377"/>
-            <a:ext cx="4989326" cy="891426"/>
+            <a:off x="753140" y="2945381"/>
+            <a:ext cx="5181600" cy="1052461"/>
           </a:xfrm>
         </p:spPr>
       </p:pic>
@@ -9211,7 +9269,7 @@
           <p:cNvPr id="4" name="내용 개체 틀 3">
             <a:extLst>
               <a:ext uri="{FF2B5EF4-FFF2-40B4-BE49-F238E27FC236}">
-                <a16:creationId xmlns:a16="http://schemas.microsoft.com/office/drawing/2014/main" id="{94E4D64E-0FA2-4A9C-99DF-83A3DA7D624C}"/>
+                <a16:creationId xmlns:a16="http://schemas.microsoft.com/office/drawing/2014/main" id="{9ADD6CEA-F498-40A1-8653-0FE387641709}"/>
               </a:ext>
             </a:extLst>
           </p:cNvPr>
@@ -9232,17 +9290,20 @@
             </a:pPr>
             <a:r>
               <a:rPr lang="ko-KR" altLang="en-US" dirty="0"/>
-              <a:t>텍스트 형태의 </a:t>
+              <a:t>해당 주소로 </a:t>
             </a:r>
             <a:r>
               <a:rPr lang="en-US" altLang="ko-KR" dirty="0"/>
-              <a:t>HTML</a:t>
+              <a:t>GET </a:t>
             </a:r>
             <a:r>
               <a:rPr lang="ko-KR" altLang="en-US" dirty="0"/>
-              <a:t>코드를 </a:t>
-            </a:r>
-            <a:endParaRPr lang="en-US" altLang="ko-KR" dirty="0"/>
+              <a:t>요청을 보낸다</a:t>
+            </a:r>
+            <a:r>
+              <a:rPr lang="en-US" altLang="ko-KR" dirty="0"/>
+              <a:t>.</a:t>
+            </a:r>
           </a:p>
           <a:p>
             <a:pPr marL="0" indent="0">
@@ -9250,17 +9311,38 @@
             </a:pPr>
             <a:r>
               <a:rPr lang="ko-KR" altLang="en-US" dirty="0"/>
-              <a:t>태그를 추출하기 쉬운 객체로 </a:t>
-            </a:r>
-            <a:endParaRPr lang="en-US" altLang="ko-KR" dirty="0"/>
+              <a:t>응답을 </a:t>
+            </a:r>
+            <a:r>
+              <a:rPr lang="ko-KR" altLang="en-US" dirty="0" err="1"/>
+              <a:t>리턴한다</a:t>
+            </a:r>
+            <a:r>
+              <a:rPr lang="en-US" altLang="ko-KR" dirty="0"/>
+              <a:t>.</a:t>
+            </a:r>
           </a:p>
           <a:p>
             <a:pPr marL="0" indent="0">
               <a:buNone/>
             </a:pPr>
+            <a:endParaRPr lang="en-US" altLang="ko-KR" dirty="0"/>
+          </a:p>
+          <a:p>
+            <a:pPr marL="0" indent="0">
+              <a:buNone/>
+            </a:pPr>
             <a:r>
               <a:rPr lang="ko-KR" altLang="en-US" dirty="0"/>
-              <a:t>만들어준다</a:t>
+              <a:t>응답의 내용 </a:t>
+            </a:r>
+            <a:r>
+              <a:rPr lang="en-US" altLang="ko-KR" dirty="0"/>
+              <a:t>= HTML</a:t>
+            </a:r>
+            <a:r>
+              <a:rPr lang="ko-KR" altLang="en-US" dirty="0"/>
+              <a:t>코드</a:t>
             </a:r>
           </a:p>
         </p:txBody>
@@ -9268,7 +9350,7 @@
     </p:spTree>
     <p:extLst>
       <p:ext uri="{BB962C8B-B14F-4D97-AF65-F5344CB8AC3E}">
-        <p14:creationId xmlns:p14="http://schemas.microsoft.com/office/powerpoint/2010/main" val="937775970"/>
+        <p14:creationId xmlns:p14="http://schemas.microsoft.com/office/powerpoint/2010/main" val="500306982"/>
       </p:ext>
     </p:extLst>
   </p:cSld>
@@ -9300,7 +9382,7 @@
           <p:cNvPr id="2" name="제목 1">
             <a:extLst>
               <a:ext uri="{FF2B5EF4-FFF2-40B4-BE49-F238E27FC236}">
-                <a16:creationId xmlns:a16="http://schemas.microsoft.com/office/drawing/2014/main" id="{2DFCE869-4E89-414D-97A7-71E6D20BED6F}"/>
+                <a16:creationId xmlns:a16="http://schemas.microsoft.com/office/drawing/2014/main" id="{0B2B955C-B17A-4470-9826-C0DF6AF6B3FC}"/>
               </a:ext>
             </a:extLst>
           </p:cNvPr>
@@ -9318,7 +9400,7 @@
           <a:p>
             <a:r>
               <a:rPr lang="en-US" altLang="ko-KR" dirty="0" err="1"/>
-              <a:t>BeautifulSoup.find</a:t>
+              <a:t>BeautifulSoup</a:t>
             </a:r>
             <a:r>
               <a:rPr lang="en-US" altLang="ko-KR" dirty="0"/>
@@ -9333,7 +9415,7 @@
           <p:cNvPr id="6" name="내용 개체 틀 5">
             <a:extLst>
               <a:ext uri="{FF2B5EF4-FFF2-40B4-BE49-F238E27FC236}">
-                <a16:creationId xmlns:a16="http://schemas.microsoft.com/office/drawing/2014/main" id="{06705329-14AA-4F77-81AC-D57EF8534EF0}"/>
+                <a16:creationId xmlns:a16="http://schemas.microsoft.com/office/drawing/2014/main" id="{EDD82888-185E-414E-AEB7-43A1CAA474B4}"/>
               </a:ext>
             </a:extLst>
           </p:cNvPr>
@@ -9352,8 +9434,8 @@
         </p:blipFill>
         <p:spPr>
           <a:xfrm>
-            <a:off x="592459" y="2062716"/>
-            <a:ext cx="5177312" cy="1651809"/>
+            <a:off x="651163" y="2376377"/>
+            <a:ext cx="4989326" cy="891426"/>
           </a:xfrm>
         </p:spPr>
       </p:pic>
@@ -9362,7 +9444,7 @@
           <p:cNvPr id="4" name="내용 개체 틀 3">
             <a:extLst>
               <a:ext uri="{FF2B5EF4-FFF2-40B4-BE49-F238E27FC236}">
-                <a16:creationId xmlns:a16="http://schemas.microsoft.com/office/drawing/2014/main" id="{E6ED0BBF-7A22-48FC-8DB7-BAC82F413691}"/>
+                <a16:creationId xmlns:a16="http://schemas.microsoft.com/office/drawing/2014/main" id="{94E4D64E-0FA2-4A9C-99DF-83A3DA7D624C}"/>
               </a:ext>
             </a:extLst>
           </p:cNvPr>
@@ -9383,23 +9465,15 @@
             </a:pPr>
             <a:r>
               <a:rPr lang="ko-KR" altLang="en-US" dirty="0"/>
-              <a:t>태그이름</a:t>
+              <a:t>텍스트 형태의 </a:t>
             </a:r>
             <a:r>
               <a:rPr lang="en-US" altLang="ko-KR" dirty="0"/>
-              <a:t>,</a:t>
+              <a:t>HTML</a:t>
             </a:r>
             <a:r>
               <a:rPr lang="ko-KR" altLang="en-US" dirty="0"/>
-              <a:t>속성</a:t>
-            </a:r>
-            <a:r>
-              <a:rPr lang="en-US" altLang="ko-KR" dirty="0"/>
-              <a:t>,</a:t>
-            </a:r>
-            <a:r>
-              <a:rPr lang="ko-KR" altLang="en-US" dirty="0"/>
-              <a:t>속성값 등을 </a:t>
+              <a:t>코드를 </a:t>
             </a:r>
             <a:endParaRPr lang="en-US" altLang="ko-KR" dirty="0"/>
           </a:p>
@@ -9409,7 +9483,17 @@
             </a:pPr>
             <a:r>
               <a:rPr lang="ko-KR" altLang="en-US" dirty="0"/>
-              <a:t>통해서 원하는 태그를 찾아낸다</a:t>
+              <a:t>태그를 추출하기 쉬운 객체로 </a:t>
+            </a:r>
+            <a:endParaRPr lang="en-US" altLang="ko-KR" dirty="0"/>
+          </a:p>
+          <a:p>
+            <a:pPr marL="0" indent="0">
+              <a:buNone/>
+            </a:pPr>
+            <a:r>
+              <a:rPr lang="ko-KR" altLang="en-US" dirty="0"/>
+              <a:t>만들어준다</a:t>
             </a:r>
           </a:p>
         </p:txBody>
@@ -9417,7 +9501,7 @@
     </p:spTree>
     <p:extLst>
       <p:ext uri="{BB962C8B-B14F-4D97-AF65-F5344CB8AC3E}">
-        <p14:creationId xmlns:p14="http://schemas.microsoft.com/office/powerpoint/2010/main" val="1337045236"/>
+        <p14:creationId xmlns:p14="http://schemas.microsoft.com/office/powerpoint/2010/main" val="937775970"/>
       </p:ext>
     </p:extLst>
   </p:cSld>
@@ -9449,7 +9533,7 @@
           <p:cNvPr id="2" name="제목 1">
             <a:extLst>
               <a:ext uri="{FF2B5EF4-FFF2-40B4-BE49-F238E27FC236}">
-                <a16:creationId xmlns:a16="http://schemas.microsoft.com/office/drawing/2014/main" id="{6C77CBB0-23B5-4829-B388-B7620FDBA73C}"/>
+                <a16:creationId xmlns:a16="http://schemas.microsoft.com/office/drawing/2014/main" id="{2DFCE869-4E89-414D-97A7-71E6D20BED6F}"/>
               </a:ext>
             </a:extLst>
           </p:cNvPr>
@@ -9466,18 +9550,52 @@
           <a:lstStyle/>
           <a:p>
             <a:r>
-              <a:rPr lang="ko-KR" altLang="en-US" dirty="0"/>
-              <a:t>정보 가져오는 과정</a:t>
-            </a:r>
-          </a:p>
-        </p:txBody>
-      </p:sp>
-      <p:sp>
-        <p:nvSpPr>
-          <p:cNvPr id="3" name="내용 개체 틀 2">
-            <a:extLst>
-              <a:ext uri="{FF2B5EF4-FFF2-40B4-BE49-F238E27FC236}">
-                <a16:creationId xmlns:a16="http://schemas.microsoft.com/office/drawing/2014/main" id="{DBF78CA3-505F-4994-8306-C5B5C9EC94BA}"/>
+              <a:rPr lang="en-US" altLang="ko-KR" dirty="0" err="1"/>
+              <a:t>BeautifulSoup.find</a:t>
+            </a:r>
+            <a:r>
+              <a:rPr lang="en-US" altLang="ko-KR" dirty="0"/>
+              <a:t>()</a:t>
+            </a:r>
+            <a:endParaRPr lang="ko-KR" altLang="en-US" dirty="0"/>
+          </a:p>
+        </p:txBody>
+      </p:sp>
+      <p:pic>
+        <p:nvPicPr>
+          <p:cNvPr id="6" name="내용 개체 틀 5">
+            <a:extLst>
+              <a:ext uri="{FF2B5EF4-FFF2-40B4-BE49-F238E27FC236}">
+                <a16:creationId xmlns:a16="http://schemas.microsoft.com/office/drawing/2014/main" id="{06705329-14AA-4F77-81AC-D57EF8534EF0}"/>
+              </a:ext>
+            </a:extLst>
+          </p:cNvPr>
+          <p:cNvPicPr>
+            <a:picLocks noGrp="1" noChangeAspect="1"/>
+          </p:cNvPicPr>
+          <p:nvPr>
+            <p:ph sz="half" idx="1"/>
+          </p:nvPr>
+        </p:nvPicPr>
+        <p:blipFill>
+          <a:blip r:embed="rId2"/>
+          <a:stretch>
+            <a:fillRect/>
+          </a:stretch>
+        </p:blipFill>
+        <p:spPr>
+          <a:xfrm>
+            <a:off x="592459" y="2062716"/>
+            <a:ext cx="5177312" cy="1651809"/>
+          </a:xfrm>
+        </p:spPr>
+      </p:pic>
+      <p:sp>
+        <p:nvSpPr>
+          <p:cNvPr id="4" name="내용 개체 틀 3">
+            <a:extLst>
+              <a:ext uri="{FF2B5EF4-FFF2-40B4-BE49-F238E27FC236}">
+                <a16:creationId xmlns:a16="http://schemas.microsoft.com/office/drawing/2014/main" id="{E6ED0BBF-7A22-48FC-8DB7-BAC82F413691}"/>
               </a:ext>
             </a:extLst>
           </p:cNvPr>
@@ -9485,7 +9603,7 @@
             <a:spLocks noGrp="1"/>
           </p:cNvSpPr>
           <p:nvPr>
-            <p:ph idx="1"/>
+            <p:ph sz="half" idx="2"/>
           </p:nvPr>
         </p:nvSpPr>
         <p:spPr/>
@@ -9497,20 +9615,24 @@
               <a:buNone/>
             </a:pPr>
             <a:r>
+              <a:rPr lang="ko-KR" altLang="en-US" dirty="0"/>
+              <a:t>태그이름</a:t>
+            </a:r>
+            <a:r>
               <a:rPr lang="en-US" altLang="ko-KR" dirty="0"/>
-              <a:t>1.requests.get</a:t>
+              <a:t>,</a:t>
             </a:r>
             <a:r>
               <a:rPr lang="ko-KR" altLang="en-US" dirty="0"/>
-              <a:t>으로 해당 웹페이지의 </a:t>
+              <a:t>속성</a:t>
             </a:r>
             <a:r>
               <a:rPr lang="en-US" altLang="ko-KR" dirty="0"/>
-              <a:t>html</a:t>
+              <a:t>,</a:t>
             </a:r>
             <a:r>
               <a:rPr lang="ko-KR" altLang="en-US" dirty="0"/>
-              <a:t>코드를 문자열로 가져오기</a:t>
+              <a:t>속성값 등을 </a:t>
             </a:r>
             <a:endParaRPr lang="en-US" altLang="ko-KR" dirty="0"/>
           </a:p>
@@ -9518,51 +9640,9 @@
             <a:pPr marL="0" indent="0">
               <a:buNone/>
             </a:pPr>
-            <a:endParaRPr lang="en-US" altLang="ko-KR" dirty="0"/>
-          </a:p>
-          <a:p>
-            <a:pPr marL="0" indent="0">
-              <a:buNone/>
-            </a:pPr>
-            <a:r>
-              <a:rPr lang="en-US" altLang="ko-KR" dirty="0"/>
-              <a:t>2.BeautifulSoup</a:t>
-            </a:r>
             <a:r>
               <a:rPr lang="ko-KR" altLang="en-US" dirty="0"/>
-              <a:t>로 </a:t>
-            </a:r>
-            <a:r>
-              <a:rPr lang="en-US" altLang="ko-KR" dirty="0"/>
-              <a:t>html </a:t>
-            </a:r>
-            <a:r>
-              <a:rPr lang="ko-KR" altLang="en-US" dirty="0"/>
-              <a:t>코드로 </a:t>
-            </a:r>
-            <a:r>
-              <a:rPr lang="ko-KR" altLang="en-US" dirty="0" err="1"/>
-              <a:t>파싱하기</a:t>
-            </a:r>
-            <a:endParaRPr lang="en-US" altLang="ko-KR" dirty="0"/>
-          </a:p>
-          <a:p>
-            <a:pPr marL="0" indent="0">
-              <a:buNone/>
-            </a:pPr>
-            <a:endParaRPr lang="en-US" altLang="ko-KR" dirty="0"/>
-          </a:p>
-          <a:p>
-            <a:pPr marL="0" indent="0">
-              <a:buNone/>
-            </a:pPr>
-            <a:r>
-              <a:rPr lang="en-US" altLang="ko-KR" dirty="0"/>
-              <a:t>3.find()</a:t>
-            </a:r>
-            <a:r>
-              <a:rPr lang="ko-KR" altLang="en-US" dirty="0"/>
-              <a:t>를 통해 원하는 태그의 정보를 가져오기</a:t>
+              <a:t>통해서 원하는 태그를 찾아낸다</a:t>
             </a:r>
           </a:p>
         </p:txBody>
@@ -9570,7 +9650,7 @@
     </p:spTree>
     <p:extLst>
       <p:ext uri="{BB962C8B-B14F-4D97-AF65-F5344CB8AC3E}">
-        <p14:creationId xmlns:p14="http://schemas.microsoft.com/office/powerpoint/2010/main" val="1698637792"/>
+        <p14:creationId xmlns:p14="http://schemas.microsoft.com/office/powerpoint/2010/main" val="1337045236"/>
       </p:ext>
     </p:extLst>
   </p:cSld>
@@ -9602,6 +9682,159 @@
           <p:cNvPr id="2" name="제목 1">
             <a:extLst>
               <a:ext uri="{FF2B5EF4-FFF2-40B4-BE49-F238E27FC236}">
+                <a16:creationId xmlns:a16="http://schemas.microsoft.com/office/drawing/2014/main" id="{6C77CBB0-23B5-4829-B388-B7620FDBA73C}"/>
+              </a:ext>
+            </a:extLst>
+          </p:cNvPr>
+          <p:cNvSpPr>
+            <a:spLocks noGrp="1"/>
+          </p:cNvSpPr>
+          <p:nvPr>
+            <p:ph type="title"/>
+          </p:nvPr>
+        </p:nvSpPr>
+        <p:spPr/>
+        <p:txBody>
+          <a:bodyPr/>
+          <a:lstStyle/>
+          <a:p>
+            <a:r>
+              <a:rPr lang="ko-KR" altLang="en-US" dirty="0"/>
+              <a:t>정보 가져오는 과정</a:t>
+            </a:r>
+          </a:p>
+        </p:txBody>
+      </p:sp>
+      <p:sp>
+        <p:nvSpPr>
+          <p:cNvPr id="3" name="내용 개체 틀 2">
+            <a:extLst>
+              <a:ext uri="{FF2B5EF4-FFF2-40B4-BE49-F238E27FC236}">
+                <a16:creationId xmlns:a16="http://schemas.microsoft.com/office/drawing/2014/main" id="{DBF78CA3-505F-4994-8306-C5B5C9EC94BA}"/>
+              </a:ext>
+            </a:extLst>
+          </p:cNvPr>
+          <p:cNvSpPr>
+            <a:spLocks noGrp="1"/>
+          </p:cNvSpPr>
+          <p:nvPr>
+            <p:ph idx="1"/>
+          </p:nvPr>
+        </p:nvSpPr>
+        <p:spPr/>
+        <p:txBody>
+          <a:bodyPr/>
+          <a:lstStyle/>
+          <a:p>
+            <a:pPr marL="0" indent="0">
+              <a:buNone/>
+            </a:pPr>
+            <a:r>
+              <a:rPr lang="en-US" altLang="ko-KR" dirty="0"/>
+              <a:t>1.requests.get</a:t>
+            </a:r>
+            <a:r>
+              <a:rPr lang="ko-KR" altLang="en-US" dirty="0"/>
+              <a:t>으로 해당 웹페이지의 </a:t>
+            </a:r>
+            <a:r>
+              <a:rPr lang="en-US" altLang="ko-KR" dirty="0"/>
+              <a:t>html</a:t>
+            </a:r>
+            <a:r>
+              <a:rPr lang="ko-KR" altLang="en-US" dirty="0"/>
+              <a:t>코드를 문자열로 가져오기</a:t>
+            </a:r>
+            <a:endParaRPr lang="en-US" altLang="ko-KR" dirty="0"/>
+          </a:p>
+          <a:p>
+            <a:pPr marL="0" indent="0">
+              <a:buNone/>
+            </a:pPr>
+            <a:endParaRPr lang="en-US" altLang="ko-KR" dirty="0"/>
+          </a:p>
+          <a:p>
+            <a:pPr marL="0" indent="0">
+              <a:buNone/>
+            </a:pPr>
+            <a:r>
+              <a:rPr lang="en-US" altLang="ko-KR" dirty="0"/>
+              <a:t>2.BeautifulSoup</a:t>
+            </a:r>
+            <a:r>
+              <a:rPr lang="ko-KR" altLang="en-US" dirty="0"/>
+              <a:t>로 </a:t>
+            </a:r>
+            <a:r>
+              <a:rPr lang="en-US" altLang="ko-KR" dirty="0"/>
+              <a:t>html </a:t>
+            </a:r>
+            <a:r>
+              <a:rPr lang="ko-KR" altLang="en-US" dirty="0"/>
+              <a:t>코드로 </a:t>
+            </a:r>
+            <a:r>
+              <a:rPr lang="ko-KR" altLang="en-US" dirty="0" err="1"/>
+              <a:t>파싱하기</a:t>
+            </a:r>
+            <a:endParaRPr lang="en-US" altLang="ko-KR" dirty="0"/>
+          </a:p>
+          <a:p>
+            <a:pPr marL="0" indent="0">
+              <a:buNone/>
+            </a:pPr>
+            <a:endParaRPr lang="en-US" altLang="ko-KR" dirty="0"/>
+          </a:p>
+          <a:p>
+            <a:pPr marL="0" indent="0">
+              <a:buNone/>
+            </a:pPr>
+            <a:r>
+              <a:rPr lang="en-US" altLang="ko-KR" dirty="0"/>
+              <a:t>3.find()</a:t>
+            </a:r>
+            <a:r>
+              <a:rPr lang="ko-KR" altLang="en-US" dirty="0"/>
+              <a:t>를 통해 원하는 태그의 정보를 가져오기</a:t>
+            </a:r>
+          </a:p>
+        </p:txBody>
+      </p:sp>
+    </p:spTree>
+    <p:extLst>
+      <p:ext uri="{BB962C8B-B14F-4D97-AF65-F5344CB8AC3E}">
+        <p14:creationId xmlns:p14="http://schemas.microsoft.com/office/powerpoint/2010/main" val="1698637792"/>
+      </p:ext>
+    </p:extLst>
+  </p:cSld>
+  <p:clrMapOvr>
+    <a:masterClrMapping/>
+  </p:clrMapOvr>
+</p:sld>
+</file>
+
+<file path=ppt/slides/slide17.xml><?xml version="1.0" encoding="utf-8"?>
+<p:sld xmlns:a="http://schemas.openxmlformats.org/drawingml/2006/main" xmlns:r="http://schemas.openxmlformats.org/officeDocument/2006/relationships" xmlns:p="http://schemas.openxmlformats.org/presentationml/2006/main">
+  <p:cSld>
+    <p:spTree>
+      <p:nvGrpSpPr>
+        <p:cNvPr id="1" name=""/>
+        <p:cNvGrpSpPr/>
+        <p:nvPr/>
+      </p:nvGrpSpPr>
+      <p:grpSpPr>
+        <a:xfrm>
+          <a:off x="0" y="0"/>
+          <a:ext cx="0" cy="0"/>
+          <a:chOff x="0" y="0"/>
+          <a:chExt cx="0" cy="0"/>
+        </a:xfrm>
+      </p:grpSpPr>
+      <p:sp>
+        <p:nvSpPr>
+          <p:cNvPr id="2" name="제목 1">
+            <a:extLst>
+              <a:ext uri="{FF2B5EF4-FFF2-40B4-BE49-F238E27FC236}">
                 <a16:creationId xmlns:a16="http://schemas.microsoft.com/office/drawing/2014/main" id="{758473EE-52A2-4983-A8FC-FC4D0638800F}"/>
               </a:ext>
             </a:extLst>
@@ -9705,7 +9938,7 @@
 </p:sld>
 </file>
 
-<file path=ppt/slides/slide17.xml><?xml version="1.0" encoding="utf-8"?>
+<file path=ppt/slides/slide18.xml><?xml version="1.0" encoding="utf-8"?>
 <p:sld xmlns:a="http://schemas.openxmlformats.org/drawingml/2006/main" xmlns:r="http://schemas.openxmlformats.org/officeDocument/2006/relationships" xmlns:p="http://schemas.openxmlformats.org/presentationml/2006/main">
   <p:cSld>
     <p:spTree>
@@ -9826,7 +10059,7 @@
 </p:sld>
 </file>
 
-<file path=ppt/slides/slide18.xml><?xml version="1.0" encoding="utf-8"?>
+<file path=ppt/slides/slide19.xml><?xml version="1.0" encoding="utf-8"?>
 <p:sld xmlns:a="http://schemas.openxmlformats.org/drawingml/2006/main" xmlns:r="http://schemas.openxmlformats.org/officeDocument/2006/relationships" xmlns:p="http://schemas.openxmlformats.org/presentationml/2006/main">
   <p:cSld>
     <p:bg>
@@ -10090,115 +10323,6 @@
 </p:sld>
 </file>
 
-<file path=ppt/slides/slide19.xml><?xml version="1.0" encoding="utf-8"?>
-<p:sld xmlns:a="http://schemas.openxmlformats.org/drawingml/2006/main" xmlns:r="http://schemas.openxmlformats.org/officeDocument/2006/relationships" xmlns:p="http://schemas.openxmlformats.org/presentationml/2006/main">
-  <p:cSld>
-    <p:spTree>
-      <p:nvGrpSpPr>
-        <p:cNvPr id="1" name=""/>
-        <p:cNvGrpSpPr/>
-        <p:nvPr/>
-      </p:nvGrpSpPr>
-      <p:grpSpPr>
-        <a:xfrm>
-          <a:off x="0" y="0"/>
-          <a:ext cx="0" cy="0"/>
-          <a:chOff x="0" y="0"/>
-          <a:chExt cx="0" cy="0"/>
-        </a:xfrm>
-      </p:grpSpPr>
-      <p:sp>
-        <p:nvSpPr>
-          <p:cNvPr id="2" name="제목 1">
-            <a:extLst>
-              <a:ext uri="{FF2B5EF4-FFF2-40B4-BE49-F238E27FC236}">
-                <a16:creationId xmlns:a16="http://schemas.microsoft.com/office/drawing/2014/main" id="{F633B8FB-103A-49A6-87C7-76E325AB186D}"/>
-              </a:ext>
-            </a:extLst>
-          </p:cNvPr>
-          <p:cNvSpPr>
-            <a:spLocks noGrp="1"/>
-          </p:cNvSpPr>
-          <p:nvPr>
-            <p:ph type="title"/>
-          </p:nvPr>
-        </p:nvSpPr>
-        <p:spPr/>
-        <p:txBody>
-          <a:bodyPr>
-            <a:normAutofit/>
-          </a:bodyPr>
-          <a:lstStyle/>
-          <a:p>
-            <a:r>
-              <a:rPr lang="ko-KR" altLang="en-US" sz="4000" dirty="0"/>
-              <a:t>현재 강수확률이 있는 </a:t>
-            </a:r>
-            <a:r>
-              <a:rPr lang="en-US" altLang="ko-KR" sz="4000" dirty="0"/>
-              <a:t>HTML </a:t>
-            </a:r>
-            <a:r>
-              <a:rPr lang="ko-KR" altLang="en-US" sz="4000" dirty="0"/>
-              <a:t>태그 찾아보기</a:t>
-            </a:r>
-          </a:p>
-        </p:txBody>
-      </p:sp>
-      <p:sp>
-        <p:nvSpPr>
-          <p:cNvPr id="3" name="내용 개체 틀 2">
-            <a:extLst>
-              <a:ext uri="{FF2B5EF4-FFF2-40B4-BE49-F238E27FC236}">
-                <a16:creationId xmlns:a16="http://schemas.microsoft.com/office/drawing/2014/main" id="{80B509B6-2CFE-40AD-82E5-8347FB3E089F}"/>
-              </a:ext>
-            </a:extLst>
-          </p:cNvPr>
-          <p:cNvSpPr>
-            <a:spLocks noGrp="1"/>
-          </p:cNvSpPr>
-          <p:nvPr>
-            <p:ph idx="1"/>
-          </p:nvPr>
-        </p:nvSpPr>
-        <p:spPr/>
-        <p:txBody>
-          <a:bodyPr/>
-          <a:lstStyle/>
-          <a:p>
-            <a:pPr marL="0" indent="0">
-              <a:buNone/>
-            </a:pPr>
-            <a:endParaRPr lang="en-US" altLang="ko-KR" dirty="0"/>
-          </a:p>
-          <a:p>
-            <a:pPr marL="0" indent="0">
-              <a:buNone/>
-            </a:pPr>
-            <a:r>
-              <a:rPr lang="en-US" altLang="ko-KR" dirty="0"/>
-              <a:t>HTML</a:t>
-            </a:r>
-            <a:r>
-              <a:rPr lang="ko-KR" altLang="en-US" dirty="0"/>
-              <a:t>에서 현재 강수확률 정보가 있는 태그 찾아보기</a:t>
-            </a:r>
-          </a:p>
-        </p:txBody>
-      </p:sp>
-    </p:spTree>
-    <p:extLst>
-      <p:ext uri="{BB962C8B-B14F-4D97-AF65-F5344CB8AC3E}">
-        <p14:creationId xmlns:p14="http://schemas.microsoft.com/office/powerpoint/2010/main" val="1129725667"/>
-      </p:ext>
-    </p:extLst>
-  </p:cSld>
-  <p:clrMapOvr>
-    <a:masterClrMapping/>
-  </p:clrMapOvr>
-</p:sld>
-</file>
-
 <file path=ppt/slides/slide2.xml><?xml version="1.0" encoding="utf-8"?>
 <p:sld xmlns:a="http://schemas.openxmlformats.org/drawingml/2006/main" xmlns:r="http://schemas.openxmlformats.org/officeDocument/2006/relationships" xmlns:p="http://schemas.openxmlformats.org/presentationml/2006/main">
   <p:cSld>
@@ -10359,6 +10483,115 @@
           <p:cNvPr id="2" name="제목 1">
             <a:extLst>
               <a:ext uri="{FF2B5EF4-FFF2-40B4-BE49-F238E27FC236}">
+                <a16:creationId xmlns:a16="http://schemas.microsoft.com/office/drawing/2014/main" id="{F633B8FB-103A-49A6-87C7-76E325AB186D}"/>
+              </a:ext>
+            </a:extLst>
+          </p:cNvPr>
+          <p:cNvSpPr>
+            <a:spLocks noGrp="1"/>
+          </p:cNvSpPr>
+          <p:nvPr>
+            <p:ph type="title"/>
+          </p:nvPr>
+        </p:nvSpPr>
+        <p:spPr/>
+        <p:txBody>
+          <a:bodyPr>
+            <a:normAutofit/>
+          </a:bodyPr>
+          <a:lstStyle/>
+          <a:p>
+            <a:r>
+              <a:rPr lang="ko-KR" altLang="en-US" sz="4000" dirty="0"/>
+              <a:t>현재 강수확률이 있는 </a:t>
+            </a:r>
+            <a:r>
+              <a:rPr lang="en-US" altLang="ko-KR" sz="4000" dirty="0"/>
+              <a:t>HTML </a:t>
+            </a:r>
+            <a:r>
+              <a:rPr lang="ko-KR" altLang="en-US" sz="4000" dirty="0"/>
+              <a:t>태그 찾아보기</a:t>
+            </a:r>
+          </a:p>
+        </p:txBody>
+      </p:sp>
+      <p:sp>
+        <p:nvSpPr>
+          <p:cNvPr id="3" name="내용 개체 틀 2">
+            <a:extLst>
+              <a:ext uri="{FF2B5EF4-FFF2-40B4-BE49-F238E27FC236}">
+                <a16:creationId xmlns:a16="http://schemas.microsoft.com/office/drawing/2014/main" id="{80B509B6-2CFE-40AD-82E5-8347FB3E089F}"/>
+              </a:ext>
+            </a:extLst>
+          </p:cNvPr>
+          <p:cNvSpPr>
+            <a:spLocks noGrp="1"/>
+          </p:cNvSpPr>
+          <p:nvPr>
+            <p:ph idx="1"/>
+          </p:nvPr>
+        </p:nvSpPr>
+        <p:spPr/>
+        <p:txBody>
+          <a:bodyPr/>
+          <a:lstStyle/>
+          <a:p>
+            <a:pPr marL="0" indent="0">
+              <a:buNone/>
+            </a:pPr>
+            <a:endParaRPr lang="en-US" altLang="ko-KR" dirty="0"/>
+          </a:p>
+          <a:p>
+            <a:pPr marL="0" indent="0">
+              <a:buNone/>
+            </a:pPr>
+            <a:r>
+              <a:rPr lang="en-US" altLang="ko-KR" dirty="0"/>
+              <a:t>HTML</a:t>
+            </a:r>
+            <a:r>
+              <a:rPr lang="ko-KR" altLang="en-US" dirty="0"/>
+              <a:t>에서 현재 강수확률 정보가 있는 태그 찾아보기</a:t>
+            </a:r>
+          </a:p>
+        </p:txBody>
+      </p:sp>
+    </p:spTree>
+    <p:extLst>
+      <p:ext uri="{BB962C8B-B14F-4D97-AF65-F5344CB8AC3E}">
+        <p14:creationId xmlns:p14="http://schemas.microsoft.com/office/powerpoint/2010/main" val="1129725667"/>
+      </p:ext>
+    </p:extLst>
+  </p:cSld>
+  <p:clrMapOvr>
+    <a:masterClrMapping/>
+  </p:clrMapOvr>
+</p:sld>
+</file>
+
+<file path=ppt/slides/slide21.xml><?xml version="1.0" encoding="utf-8"?>
+<p:sld xmlns:a="http://schemas.openxmlformats.org/drawingml/2006/main" xmlns:r="http://schemas.openxmlformats.org/officeDocument/2006/relationships" xmlns:p="http://schemas.openxmlformats.org/presentationml/2006/main">
+  <p:cSld>
+    <p:spTree>
+      <p:nvGrpSpPr>
+        <p:cNvPr id="1" name=""/>
+        <p:cNvGrpSpPr/>
+        <p:nvPr/>
+      </p:nvGrpSpPr>
+      <p:grpSpPr>
+        <a:xfrm>
+          <a:off x="0" y="0"/>
+          <a:ext cx="0" cy="0"/>
+          <a:chOff x="0" y="0"/>
+          <a:chExt cx="0" cy="0"/>
+        </a:xfrm>
+      </p:grpSpPr>
+      <p:sp>
+        <p:nvSpPr>
+          <p:cNvPr id="2" name="제목 1">
+            <a:extLst>
+              <a:ext uri="{FF2B5EF4-FFF2-40B4-BE49-F238E27FC236}">
                 <a16:creationId xmlns:a16="http://schemas.microsoft.com/office/drawing/2014/main" id="{B1C13E99-B1F5-4308-A80D-C33C1D5C0A8A}"/>
               </a:ext>
             </a:extLst>
@@ -10458,7 +10691,7 @@
 </p:sld>
 </file>
 
-<file path=ppt/slides/slide21.xml><?xml version="1.0" encoding="utf-8"?>
+<file path=ppt/slides/slide22.xml><?xml version="1.0" encoding="utf-8"?>
 <p:sld xmlns:a="http://schemas.openxmlformats.org/drawingml/2006/main" xmlns:r="http://schemas.openxmlformats.org/officeDocument/2006/relationships" xmlns:p="http://schemas.openxmlformats.org/presentationml/2006/main">
   <p:cSld>
     <p:bg>
@@ -10751,7 +10984,7 @@
 </p:sld>
 </file>
 
-<file path=ppt/slides/slide22.xml><?xml version="1.0" encoding="utf-8"?>
+<file path=ppt/slides/slide23.xml><?xml version="1.0" encoding="utf-8"?>
 <p:sld xmlns:a="http://schemas.openxmlformats.org/drawingml/2006/main" xmlns:r="http://schemas.openxmlformats.org/officeDocument/2006/relationships" xmlns:p="http://schemas.openxmlformats.org/presentationml/2006/main">
   <p:cSld>
     <p:spTree>
@@ -10907,7 +11140,7 @@
 </p:sld>
 </file>
 
-<file path=ppt/slides/slide23.xml><?xml version="1.0" encoding="utf-8"?>
+<file path=ppt/slides/slide24.xml><?xml version="1.0" encoding="utf-8"?>
 <p:sld xmlns:a="http://schemas.openxmlformats.org/drawingml/2006/main" xmlns:r="http://schemas.openxmlformats.org/officeDocument/2006/relationships" xmlns:p="http://schemas.openxmlformats.org/presentationml/2006/main">
   <p:cSld>
     <p:spTree>
@@ -12983,18 +13216,18 @@
 </file>
 
 <file path=customXml/item1.xml><?xml version="1.0" encoding="utf-8"?>
+<p:properties xmlns:p="http://schemas.microsoft.com/office/2006/metadata/properties" xmlns:xsi="http://www.w3.org/2001/XMLSchema-instance" xmlns:pc="http://schemas.microsoft.com/office/infopath/2007/PartnerControls">
+  <documentManagement/>
+</p:properties>
+</file>
+
+<file path=customXml/item2.xml><?xml version="1.0" encoding="utf-8"?>
 <?mso-contentType ?>
 <FormTemplates xmlns="http://schemas.microsoft.com/sharepoint/v3/contenttype/forms">
   <Display>DocumentLibraryForm</Display>
   <Edit>DocumentLibraryForm</Edit>
   <New>DocumentLibraryForm</New>
 </FormTemplates>
-</file>
-
-<file path=customXml/item2.xml><?xml version="1.0" encoding="utf-8"?>
-<p:properties xmlns:p="http://schemas.microsoft.com/office/2006/metadata/properties" xmlns:xsi="http://www.w3.org/2001/XMLSchema-instance" xmlns:pc="http://schemas.microsoft.com/office/infopath/2007/PartnerControls">
-  <documentManagement/>
-</p:properties>
 </file>
 
 <file path=customXml/item3.xml><?xml version="1.0" encoding="utf-8"?>
@@ -13130,14 +13363,6 @@
 </file>
 
 <file path=customXml/itemProps1.xml><?xml version="1.0" encoding="utf-8"?>
-<ds:datastoreItem xmlns:ds="http://schemas.openxmlformats.org/officeDocument/2006/customXml" ds:itemID="{B94506D1-FFA9-47EE-B148-AFA604BEB1B8}">
-  <ds:schemaRefs>
-    <ds:schemaRef ds:uri="http://schemas.microsoft.com/sharepoint/v3/contenttype/forms"/>
-  </ds:schemaRefs>
-</ds:datastoreItem>
-</file>
-
-<file path=customXml/itemProps2.xml><?xml version="1.0" encoding="utf-8"?>
 <ds:datastoreItem xmlns:ds="http://schemas.openxmlformats.org/officeDocument/2006/customXml" ds:itemID="{78B8425E-138E-4BE1-A1A1-DEAF16F7CC80}">
   <ds:schemaRefs>
     <ds:schemaRef ds:uri="http://purl.org/dc/terms/"/>
@@ -13149,6 +13374,14 @@
     <ds:schemaRef ds:uri="http://schemas.microsoft.com/office/2006/metadata/properties"/>
     <ds:schemaRef ds:uri="http://schemas.microsoft.com/office/2006/documentManagement/types"/>
     <ds:schemaRef ds:uri="http://www.w3.org/XML/1998/namespace"/>
+  </ds:schemaRefs>
+</ds:datastoreItem>
+</file>
+
+<file path=customXml/itemProps2.xml><?xml version="1.0" encoding="utf-8"?>
+<ds:datastoreItem xmlns:ds="http://schemas.openxmlformats.org/officeDocument/2006/customXml" ds:itemID="{B94506D1-FFA9-47EE-B148-AFA604BEB1B8}">
+  <ds:schemaRefs>
+    <ds:schemaRef ds:uri="http://schemas.microsoft.com/sharepoint/v3/contenttype/forms"/>
   </ds:schemaRefs>
 </ds:datastoreItem>
 </file>

</xml_diff>